<commit_message>
updated latest version ppt.
</commit_message>
<xml_diff>
--- a/doc/20181007_1_wba_hackathon_2018_ota.pptx
+++ b/doc/20181007_1_wba_hackathon_2018_ota.pptx
@@ -4343,22 +4343,28 @@
         </p:nvSpPr>
         <p:spPr/>
         <p:txBody>
-          <a:bodyPr/>
+          <a:bodyPr>
+            <a:normAutofit/>
+          </a:bodyPr>
           <a:lstStyle/>
           <a:p>
             <a:r>
-              <a:rPr kumimoji="1" lang="en-US" altLang="ja-JP" dirty="0"/>
+              <a:rPr kumimoji="1" lang="ja-JP" altLang="en-US" sz="3600"/>
+              <a:t>実際に</a:t>
+            </a:r>
+            <a:r>
+              <a:rPr kumimoji="1" lang="en-US" altLang="ja-JP" sz="3600" dirty="0"/>
               <a:t>BG </a:t>
             </a:r>
             <a:r>
-              <a:rPr kumimoji="1" lang="ja-JP" altLang="en-US"/>
+              <a:rPr kumimoji="1" lang="ja-JP" altLang="en-US" sz="3600"/>
               <a:t>を強化学習させてみると</a:t>
             </a:r>
             <a:r>
-              <a:rPr kumimoji="1" lang="en-US" altLang="ja-JP" dirty="0"/>
+              <a:rPr kumimoji="1" lang="en-US" altLang="ja-JP" sz="3600" dirty="0"/>
               <a:t>…</a:t>
             </a:r>
-            <a:endParaRPr kumimoji="1" lang="ja-JP" altLang="en-US"/>
+            <a:endParaRPr kumimoji="1" lang="ja-JP" altLang="en-US" sz="3600"/>
           </a:p>
         </p:txBody>
       </p:sp>
@@ -4784,13 +4790,13 @@
         </p:nvSpPr>
         <p:spPr>
           <a:xfrm>
-            <a:off x="628650" y="1825625"/>
-            <a:ext cx="7886700" cy="2904572"/>
+            <a:off x="628650" y="1428058"/>
+            <a:ext cx="8038272" cy="2904572"/>
           </a:xfrm>
         </p:spPr>
         <p:txBody>
           <a:bodyPr>
-            <a:normAutofit fontScale="92500" lnSpcReduction="10000"/>
+            <a:normAutofit/>
           </a:bodyPr>
           <a:lstStyle/>
           <a:p>
@@ -4812,7 +4818,7 @@
             </a:r>
             <a:r>
               <a:rPr lang="ja-JP" altLang="en-US"/>
-              <a:t>データをスムースにして差分</a:t>
+              <a:t>データをスムースにして差分をとる</a:t>
             </a:r>
             <a:r>
               <a:rPr lang="en-US" altLang="ja-JP" dirty="0"/>
@@ -4830,9 +4836,6 @@
               <a:rPr lang="ja-JP" altLang="en-US"/>
               <a:t>逆フーリエ変換</a:t>
             </a:r>
-            <a:endParaRPr lang="en-US" altLang="ja-JP" dirty="0"/>
-          </a:p>
-          <a:p>
             <a:endParaRPr kumimoji="1" lang="en-US" altLang="ja-JP" dirty="0"/>
           </a:p>
           <a:p>
@@ -4906,8 +4909,8 @@
         </p:blipFill>
         <p:spPr>
           <a:xfrm>
-            <a:off x="2327968" y="4730197"/>
-            <a:ext cx="1625600" cy="1638300"/>
+            <a:off x="1815550" y="4465154"/>
+            <a:ext cx="2005498" cy="2021166"/>
           </a:xfrm>
           <a:prstGeom prst="rect">
             <a:avLst/>
@@ -4936,8 +4939,8 @@
         </p:blipFill>
         <p:spPr>
           <a:xfrm>
-            <a:off x="5521742" y="4742897"/>
-            <a:ext cx="1625600" cy="1612900"/>
+            <a:off x="5389221" y="4477853"/>
+            <a:ext cx="2005493" cy="1989825"/>
           </a:xfrm>
           <a:prstGeom prst="rect">
             <a:avLst/>
@@ -11531,7 +11534,19 @@
             </a:r>
             <a:r>
               <a:rPr lang="ja-JP" altLang="en-US"/>
-              <a:t>自体の妥当性がある程度証明された？</a:t>
+              <a:t>自体の妥当性が</a:t>
+            </a:r>
+            <a:r>
+              <a:rPr lang="ja-JP" altLang="en-US">
+                <a:solidFill>
+                  <a:srgbClr val="FF0000"/>
+                </a:solidFill>
+              </a:rPr>
+              <a:t>ある程度</a:t>
+            </a:r>
+            <a:r>
+              <a:rPr lang="ja-JP" altLang="en-US"/>
+              <a:t>証明された？</a:t>
             </a:r>
             <a:endParaRPr lang="en-US" altLang="ja-JP" dirty="0"/>
           </a:p>

</xml_diff>